<commit_message>
latest comments by Paul switch current JPG and PDF to 2021 version
</commit_message>
<xml_diff>
--- a/MoLOverviewPoster2021.pptx
+++ b/MoLOverviewPoster2021.pptx
@@ -193,7 +193,7 @@
           <a:p>
             <a:fld id="{B179243D-0E3E-4D4F-90E9-F9F1DBB34143}" type="datetimeFigureOut">
               <a:rPr lang="en-US" smtClean="0"/>
-              <a:t>6/19/21</a:t>
+              <a:t>6/25/21</a:t>
             </a:fld>
             <a:endParaRPr lang="en-US"/>
           </a:p>
@@ -2319,7 +2319,7 @@
           </a:ln>
           <a:extLst>
             <a:ext uri="{C572A759-6A51-4108-AA02-DFA0A04FC94B}">
-              <ma14:wrappingTextBoxFlag xmlns="" xmlns:ma14="http://schemas.microsoft.com/office/mac/drawingml/2011/main" val="1"/>
+              <ma14:wrappingTextBoxFlag xmlns:ma14="http://schemas.microsoft.com/office/mac/drawingml/2011/main" xmlns="" val="1"/>
             </a:ext>
           </a:extLst>
         </p:spPr>
@@ -2362,7 +2362,7 @@
           </a:ln>
           <a:extLst>
             <a:ext uri="{C572A759-6A51-4108-AA02-DFA0A04FC94B}">
-              <ma14:wrappingTextBoxFlag xmlns="" xmlns:ma14="http://schemas.microsoft.com/office/mac/drawingml/2011/main" val="1"/>
+              <ma14:wrappingTextBoxFlag xmlns:ma14="http://schemas.microsoft.com/office/mac/drawingml/2011/main" xmlns="" val="1"/>
             </a:ext>
           </a:extLst>
         </p:spPr>
@@ -3587,7 +3587,7 @@
           </a:ln>
           <a:extLst>
             <a:ext uri="{C572A759-6A51-4108-AA02-DFA0A04FC94B}">
-              <ma14:wrappingTextBoxFlag xmlns="" xmlns:ma14="http://schemas.microsoft.com/office/mac/drawingml/2011/main" val="1"/>
+              <ma14:wrappingTextBoxFlag xmlns:ma14="http://schemas.microsoft.com/office/mac/drawingml/2011/main" xmlns="" val="1"/>
             </a:ext>
           </a:extLst>
         </p:spPr>
@@ -3702,7 +3702,7 @@
           </a:ln>
           <a:extLst>
             <a:ext uri="{C572A759-6A51-4108-AA02-DFA0A04FC94B}">
-              <ma14:wrappingTextBoxFlag xmlns="" xmlns:ma14="http://schemas.microsoft.com/office/mac/drawingml/2011/main" val="1"/>
+              <ma14:wrappingTextBoxFlag xmlns:ma14="http://schemas.microsoft.com/office/mac/drawingml/2011/main" xmlns="" val="1"/>
             </a:ext>
           </a:extLst>
         </p:spPr>
@@ -3808,7 +3808,7 @@
           </a:ln>
           <a:extLst>
             <a:ext uri="{C572A759-6A51-4108-AA02-DFA0A04FC94B}">
-              <ma14:wrappingTextBoxFlag xmlns="" xmlns:ma14="http://schemas.microsoft.com/office/mac/drawingml/2011/main" val="1"/>
+              <ma14:wrappingTextBoxFlag xmlns:ma14="http://schemas.microsoft.com/office/mac/drawingml/2011/main" xmlns="" val="1"/>
             </a:ext>
           </a:extLst>
         </p:spPr>
@@ -3868,7 +3868,7 @@
           </a:ln>
           <a:extLst>
             <a:ext uri="{C572A759-6A51-4108-AA02-DFA0A04FC94B}">
-              <ma14:wrappingTextBoxFlag xmlns="" xmlns:ma14="http://schemas.microsoft.com/office/mac/drawingml/2011/main" val="1"/>
+              <ma14:wrappingTextBoxFlag xmlns:ma14="http://schemas.microsoft.com/office/mac/drawingml/2011/main" xmlns="" val="1"/>
             </a:ext>
           </a:extLst>
         </p:spPr>
@@ -4207,7 +4207,7 @@
               </a:ln>
               <a:extLst>
                 <a:ext uri="{C572A759-6A51-4108-AA02-DFA0A04FC94B}">
-                  <ma14:wrappingTextBoxFlag xmlns="" xmlns:ma14="http://schemas.microsoft.com/office/mac/drawingml/2011/main" val="1"/>
+                  <ma14:wrappingTextBoxFlag xmlns:ma14="http://schemas.microsoft.com/office/mac/drawingml/2011/main" xmlns="" val="1"/>
                 </a:ext>
               </a:extLst>
             </p:spPr>
@@ -4303,7 +4303,7 @@
           </a:ln>
           <a:extLst>
             <a:ext uri="{C572A759-6A51-4108-AA02-DFA0A04FC94B}">
-              <ma14:wrappingTextBoxFlag xmlns="" xmlns:ma14="http://schemas.microsoft.com/office/mac/drawingml/2011/main" val="1"/>
+              <ma14:wrappingTextBoxFlag xmlns:ma14="http://schemas.microsoft.com/office/mac/drawingml/2011/main" xmlns="" val="1"/>
             </a:ext>
           </a:extLst>
         </p:spPr>
@@ -4347,7 +4347,7 @@
           </a:ln>
           <a:extLst>
             <a:ext uri="{C572A759-6A51-4108-AA02-DFA0A04FC94B}">
-              <ma14:wrappingTextBoxFlag xmlns="" xmlns:ma14="http://schemas.microsoft.com/office/mac/drawingml/2011/main" val="1"/>
+              <ma14:wrappingTextBoxFlag xmlns:ma14="http://schemas.microsoft.com/office/mac/drawingml/2011/main" xmlns="" val="1"/>
             </a:ext>
           </a:extLst>
         </p:spPr>
@@ -4503,7 +4503,7 @@
             </a:ln>
             <a:extLst>
               <a:ext uri="{C572A759-6A51-4108-AA02-DFA0A04FC94B}">
-                <ma14:wrappingTextBoxFlag xmlns="" xmlns:ma14="http://schemas.microsoft.com/office/mac/drawingml/2011/main" val="1"/>
+                <ma14:wrappingTextBoxFlag xmlns:ma14="http://schemas.microsoft.com/office/mac/drawingml/2011/main" xmlns="" val="1"/>
               </a:ext>
             </a:extLst>
           </p:spPr>
@@ -4556,7 +4556,7 @@
           </a:ln>
           <a:extLst>
             <a:ext uri="{C572A759-6A51-4108-AA02-DFA0A04FC94B}">
-              <ma14:wrappingTextBoxFlag xmlns="" xmlns:ma14="http://schemas.microsoft.com/office/mac/drawingml/2011/main" val="1"/>
+              <ma14:wrappingTextBoxFlag xmlns:ma14="http://schemas.microsoft.com/office/mac/drawingml/2011/main" xmlns="" val="1"/>
             </a:ext>
           </a:extLst>
         </p:spPr>
@@ -4829,15 +4829,14 @@
             </a:br>
             <a:r>
               <a:rPr lang="en-US" sz="2900" dirty="0"/>
-              <a:t>Natural Language Processing 1 (</a:t>
-            </a:r>
-            <a:r>
-              <a:rPr lang="en-US" sz="2900" dirty="0" err="1"/>
-              <a:t>Shutova</a:t>
-            </a:r>
-            <a:r>
+              <a:t>Natural Language Processing 1 </a:t>
+            </a:r>
+            <a:br>
               <a:rPr lang="en-US" sz="2900" dirty="0"/>
-              <a:t>)</a:t>
+            </a:br>
+            <a:r>
+              <a:rPr lang="en-US" sz="2900" dirty="0"/>
+              <a:t>(TBA)</a:t>
             </a:r>
           </a:p>
         </p:txBody>
@@ -5560,22 +5559,35 @@
               <a:gd name="adj" fmla="val 16667"/>
             </a:avLst>
           </a:prstGeom>
-          <a:ln/>
+          <a:gradFill flip="none" rotWithShape="1">
+            <a:gsLst>
+              <a:gs pos="0">
+                <a:srgbClr val="FFD1BB"/>
+              </a:gs>
+              <a:gs pos="35000">
+                <a:srgbClr val="FFDECF"/>
+              </a:gs>
+              <a:gs pos="100000">
+                <a:srgbClr val="FFF2ED"/>
+              </a:gs>
+            </a:gsLst>
+            <a:lin ang="16200000" scaled="0"/>
+          </a:gradFill>
+          <a:ln w="9525" cap="flat">
+            <a:solidFill>
+              <a:srgbClr val="F69240"/>
+            </a:solidFill>
+            <a:prstDash val="solid"/>
+            <a:bevel/>
+          </a:ln>
+          <a:effectLst>
+            <a:outerShdw blurRad="38100" dist="20000" dir="5400000" rotWithShape="0">
+              <a:srgbClr val="000000">
+                <a:alpha val="38000"/>
+              </a:srgbClr>
+            </a:outerShdw>
+          </a:effectLst>
         </p:spPr>
-        <p:style>
-          <a:lnRef idx="1">
-            <a:schemeClr val="accent1"/>
-          </a:lnRef>
-          <a:fillRef idx="3">
-            <a:schemeClr val="accent1"/>
-          </a:fillRef>
-          <a:effectRef idx="2">
-            <a:schemeClr val="accent1"/>
-          </a:effectRef>
-          <a:fontRef idx="minor">
-            <a:schemeClr val="lt1"/>
-          </a:fontRef>
-        </p:style>
         <p:txBody>
           <a:bodyPr wrap="square" lIns="0" tIns="0" rIns="0" bIns="0" numCol="1" anchor="ctr">
             <a:noAutofit/>
@@ -5584,51 +5596,40 @@
           <a:p>
             <a:pPr algn="ctr"/>
             <a:r>
-              <a:rPr lang="en-US" sz="2900" dirty="0">
-                <a:solidFill>
-                  <a:schemeClr val="lt1"/>
-                </a:solidFill>
-                <a:latin typeface="Calibri" charset="0"/>
-                <a:cs typeface="Calibri" charset="0"/>
-              </a:rPr>
-              <a:t>1: [MoL-FGW] Rationality, Cognition and Reasoning </a:t>
+              <a:rPr lang="en-US" sz="2900" dirty="0"/>
+              <a:t>5</a:t>
+            </a:r>
+            <a:r>
+              <a:rPr lang="en-US" sz="2900" dirty="0">
+                <a:latin typeface="Calibri"/>
+                <a:cs typeface="Calibri"/>
+              </a:rPr>
+              <a:t>: [MoL-FGW] Rationality, Cognition and Reasoning </a:t>
             </a:r>
             <a:br>
               <a:rPr lang="en-US" sz="2900" dirty="0">
-                <a:solidFill>
-                  <a:schemeClr val="lt1"/>
-                </a:solidFill>
-                <a:latin typeface="Calibri" charset="0"/>
-                <a:cs typeface="Calibri" charset="0"/>
+                <a:latin typeface="Calibri"/>
+                <a:cs typeface="Calibri"/>
               </a:rPr>
             </a:br>
             <a:r>
               <a:rPr lang="en-US" sz="2900" dirty="0">
-                <a:solidFill>
-                  <a:schemeClr val="lt1"/>
-                </a:solidFill>
-                <a:latin typeface="Calibri" charset="0"/>
-                <a:cs typeface="Calibri" charset="0"/>
+                <a:latin typeface="Calibri"/>
+                <a:cs typeface="Calibri"/>
               </a:rPr>
               <a:t>(van </a:t>
             </a:r>
             <a:r>
               <a:rPr lang="en-US" sz="2900" dirty="0" err="1">
-                <a:solidFill>
-                  <a:schemeClr val="lt1"/>
-                </a:solidFill>
-                <a:latin typeface="Calibri" charset="0"/>
-                <a:cs typeface="Calibri" charset="0"/>
+                <a:latin typeface="Calibri"/>
+                <a:cs typeface="Calibri"/>
               </a:rPr>
               <a:t>Lambalgen</a:t>
             </a:r>
             <a:r>
               <a:rPr lang="en-US" sz="2900" dirty="0">
-                <a:solidFill>
-                  <a:schemeClr val="lt1"/>
-                </a:solidFill>
-                <a:latin typeface="Calibri" charset="0"/>
-                <a:cs typeface="Calibri" charset="0"/>
+                <a:latin typeface="Calibri"/>
+                <a:cs typeface="Calibri"/>
               </a:rPr>
               <a:t>)</a:t>
             </a:r>
@@ -7094,7 +7095,13 @@
       </p:sp>
       <p:grpSp>
         <p:nvGrpSpPr>
-          <p:cNvPr id="18" name="Group 17"/>
+          <p:cNvPr id="12" name="Group 11">
+            <a:extLst>
+              <a:ext uri="{FF2B5EF4-FFF2-40B4-BE49-F238E27FC236}">
+                <a16:creationId xmlns:a16="http://schemas.microsoft.com/office/drawing/2014/main" id="{D5051665-E4EC-184C-A6BD-7210B104001B}"/>
+              </a:ext>
+            </a:extLst>
+          </p:cNvPr>
           <p:cNvGrpSpPr/>
           <p:nvPr/>
         </p:nvGrpSpPr>
@@ -7102,8 +7109,8 @@
           <a:xfrm>
             <a:off x="38653123" y="24164373"/>
             <a:ext cx="3276000" cy="2676372"/>
-            <a:chOff x="35156122" y="21690651"/>
-            <a:chExt cx="3632244" cy="2676372"/>
+            <a:chOff x="38653123" y="24164373"/>
+            <a:chExt cx="3276000" cy="2676372"/>
           </a:xfrm>
         </p:grpSpPr>
         <p:sp>
@@ -7114,78 +7121,71 @@
           </p:nvSpPr>
           <p:spPr>
             <a:xfrm>
-              <a:off x="35156122" y="21937023"/>
-              <a:ext cx="3632244" cy="2430000"/>
+              <a:off x="38653123" y="24410745"/>
+              <a:ext cx="3276000" cy="2430000"/>
             </a:xfrm>
             <a:prstGeom prst="roundRect">
               <a:avLst>
                 <a:gd name="adj" fmla="val 16667"/>
               </a:avLst>
             </a:prstGeom>
-            <a:gradFill flip="none" rotWithShape="1">
-              <a:gsLst>
-                <a:gs pos="0">
-                  <a:srgbClr val="DAFEA4"/>
-                </a:gs>
-                <a:gs pos="35000">
-                  <a:srgbClr val="E4FDBF"/>
-                </a:gs>
-                <a:gs pos="100000">
-                  <a:srgbClr val="F5FFE6"/>
-                </a:gs>
-              </a:gsLst>
-              <a:lin ang="16200000" scaled="0"/>
-            </a:gradFill>
-            <a:ln w="76200" cap="flat">
+            <a:ln w="76200">
               <a:solidFill>
                 <a:schemeClr val="tx1"/>
               </a:solidFill>
-              <a:prstDash val="solid"/>
-              <a:bevel/>
             </a:ln>
-            <a:effectLst>
-              <a:outerShdw blurRad="38100" dist="20000" dir="5400000" rotWithShape="0">
-                <a:srgbClr val="000000">
-                  <a:alpha val="38000"/>
-                </a:srgbClr>
-              </a:outerShdw>
-            </a:effectLst>
           </p:spPr>
+          <p:style>
+            <a:lnRef idx="1">
+              <a:schemeClr val="accent4"/>
+            </a:lnRef>
+            <a:fillRef idx="2">
+              <a:schemeClr val="accent4"/>
+            </a:fillRef>
+            <a:effectRef idx="1">
+              <a:schemeClr val="accent4"/>
+            </a:effectRef>
+            <a:fontRef idx="minor">
+              <a:schemeClr val="dk1"/>
+            </a:fontRef>
+          </p:style>
           <p:txBody>
             <a:bodyPr wrap="square" lIns="0" tIns="0" rIns="0" bIns="0" numCol="1" anchor="ctr">
               <a:noAutofit/>
             </a:bodyPr>
             <a:lstStyle/>
             <a:p>
-              <a:pPr lvl="0" algn="ctr">
-                <a:defRPr sz="1800"/>
-              </a:pPr>
-              <a:endParaRPr lang="en-US" sz="2900" dirty="0"/>
+              <a:pPr algn="ctr"/>
+              <a:endParaRPr lang="en-US" sz="2900">
+                <a:solidFill>
+                  <a:schemeClr val="dk1"/>
+                </a:solidFill>
+                <a:latin typeface="+mn-lt"/>
+                <a:ea typeface="+mn-ea"/>
+                <a:cs typeface="+mn-cs"/>
+              </a:endParaRPr>
             </a:p>
             <a:p>
-              <a:pPr lvl="0" algn="ctr">
-                <a:defRPr sz="1800"/>
-              </a:pPr>
+              <a:pPr algn="ctr"/>
               <a:r>
-                <a:rPr lang="en-US" sz="2900" dirty="0"/>
-                <a:t>2: [</a:t>
+                <a:rPr lang="en-US" sz="2900">
+                  <a:solidFill>
+                    <a:schemeClr val="dk1"/>
+                  </a:solidFill>
+                  <a:latin typeface="+mn-lt"/>
+                  <a:ea typeface="+mn-ea"/>
+                  <a:cs typeface="+mn-cs"/>
+                </a:rPr>
+                <a:t>4: [MoL-FNWI] Information Theory (Torenvliet)</a:t>
               </a:r>
-              <a:r>
-                <a:rPr lang="en-US" sz="2900" dirty="0" err="1"/>
-                <a:t>MoL</a:t>
-              </a:r>
-              <a:r>
-                <a:rPr lang="en-US" sz="2900" dirty="0"/>
-                <a:t>-FNWI] Information Theory (</a:t>
-              </a:r>
-              <a:r>
-                <a:rPr lang="en-US" sz="2900" dirty="0" err="1"/>
-                <a:t>Torenvliet</a:t>
-              </a:r>
-              <a:r>
-                <a:rPr lang="en-US" sz="2900" dirty="0"/>
-                <a:t>)</a:t>
-              </a:r>
+              <a:endParaRPr lang="en-US" sz="2900" dirty="0">
+                <a:solidFill>
+                  <a:schemeClr val="dk1"/>
+                </a:solidFill>
+                <a:latin typeface="+mn-lt"/>
+                <a:ea typeface="+mn-ea"/>
+                <a:cs typeface="+mn-cs"/>
+              </a:endParaRPr>
             </a:p>
           </p:txBody>
         </p:sp>
@@ -7197,8 +7197,8 @@
           </p:nvSpPr>
           <p:spPr>
             <a:xfrm>
-              <a:off x="36161721" y="21690651"/>
-              <a:ext cx="1497972" cy="1204325"/>
+              <a:off x="39560095" y="24164373"/>
+              <a:ext cx="1351054" cy="1204325"/>
             </a:xfrm>
             <a:prstGeom prst="rect">
               <a:avLst/>
@@ -7208,7 +7208,7 @@
             </a:ln>
             <a:extLst>
               <a:ext uri="{C572A759-6A51-4108-AA02-DFA0A04FC94B}">
-                <ma14:wrappingTextBoxFlag xmlns="" xmlns:ma14="http://schemas.microsoft.com/office/mac/drawingml/2011/main" val="1"/>
+                <ma14:wrappingTextBoxFlag xmlns:ma14="http://schemas.microsoft.com/office/mac/drawingml/2011/main" xmlns="" val="1"/>
               </a:ext>
             </a:extLst>
           </p:spPr>
@@ -7222,14 +7222,24 @@
               </a:lvl1pPr>
             </a:lstStyle>
             <a:p>
-              <a:pPr lvl="0" algn="ctr">
-                <a:defRPr sz="1800"/>
-              </a:pPr>
+              <a:pPr algn="ctr"/>
               <a:r>
-                <a:rPr lang="en-US" sz="3300" b="1" dirty="0"/>
+                <a:rPr lang="en-US" sz="3300" b="1">
+                  <a:solidFill>
+                    <a:schemeClr val="tx1"/>
+                  </a:solidFill>
+                  <a:latin typeface="Calibri"/>
+                  <a:cs typeface="Calibri"/>
+                </a:rPr>
                 <a:t>L&amp;C</a:t>
               </a:r>
-              <a:endParaRPr sz="3300" b="1" dirty="0"/>
+              <a:endParaRPr sz="3300" b="1" dirty="0">
+                <a:solidFill>
+                  <a:schemeClr val="tx1"/>
+                </a:solidFill>
+                <a:latin typeface="Calibri"/>
+                <a:cs typeface="Calibri"/>
+              </a:endParaRPr>
             </a:p>
           </p:txBody>
         </p:sp>
@@ -7347,7 +7357,7 @@
             </a:ln>
             <a:extLst>
               <a:ext uri="{C572A759-6A51-4108-AA02-DFA0A04FC94B}">
-                <ma14:wrappingTextBoxFlag xmlns="" xmlns:ma14="http://schemas.microsoft.com/office/mac/drawingml/2011/main" val="1"/>
+                <ma14:wrappingTextBoxFlag xmlns:ma14="http://schemas.microsoft.com/office/mac/drawingml/2011/main" xmlns="" val="1"/>
               </a:ext>
             </a:extLst>
           </p:spPr>
@@ -7365,7 +7375,7 @@
                 <a:defRPr sz="1800"/>
               </a:pPr>
               <a:r>
-                <a:rPr lang="en-US" sz="3300" b="1">
+                <a:rPr lang="en-US" sz="3300" b="1" dirty="0">
                   <a:solidFill>
                     <a:schemeClr val="tx1"/>
                   </a:solidFill>
@@ -7956,7 +7966,7 @@
             </a:ln>
             <a:extLst>
               <a:ext uri="{C572A759-6A51-4108-AA02-DFA0A04FC94B}">
-                <ma14:wrappingTextBoxFlag xmlns="" xmlns:ma14="http://schemas.microsoft.com/office/mac/drawingml/2011/main" val="1"/>
+                <ma14:wrappingTextBoxFlag xmlns:ma14="http://schemas.microsoft.com/office/mac/drawingml/2011/main" xmlns="" val="1"/>
               </a:ext>
             </a:extLst>
           </p:spPr>
@@ -8122,7 +8132,7 @@
             </a:ln>
             <a:extLst>
               <a:ext uri="{C572A759-6A51-4108-AA02-DFA0A04FC94B}">
-                <ma14:wrappingTextBoxFlag xmlns="" xmlns:ma14="http://schemas.microsoft.com/office/mac/drawingml/2011/main" val="1"/>
+                <ma14:wrappingTextBoxFlag xmlns:ma14="http://schemas.microsoft.com/office/mac/drawingml/2011/main" xmlns="" val="1"/>
               </a:ext>
             </a:extLst>
           </p:spPr>
@@ -8161,7 +8171,7 @@
           </a:ln>
           <a:extLst>
             <a:ext uri="{C572A759-6A51-4108-AA02-DFA0A04FC94B}">
-              <ma14:wrappingTextBoxFlag xmlns="" xmlns:ma14="http://schemas.microsoft.com/office/mac/drawingml/2011/main" val="1"/>
+              <ma14:wrappingTextBoxFlag xmlns:ma14="http://schemas.microsoft.com/office/mac/drawingml/2011/main" xmlns="" val="1"/>
             </a:ext>
           </a:extLst>
         </p:spPr>
@@ -8653,7 +8663,7 @@
             </a:ln>
             <a:extLst>
               <a:ext uri="{C572A759-6A51-4108-AA02-DFA0A04FC94B}">
-                <ma14:wrappingTextBoxFlag xmlns="" xmlns:ma14="http://schemas.microsoft.com/office/mac/drawingml/2011/main" val="1"/>
+                <ma14:wrappingTextBoxFlag xmlns:ma14="http://schemas.microsoft.com/office/mac/drawingml/2011/main" xmlns="" val="1"/>
               </a:ext>
             </a:extLst>
           </p:spPr>
@@ -8869,7 +8879,7 @@
             </a:ln>
             <a:extLst>
               <a:ext uri="{C572A759-6A51-4108-AA02-DFA0A04FC94B}">
-                <ma14:wrappingTextBoxFlag xmlns="" xmlns:ma14="http://schemas.microsoft.com/office/mac/drawingml/2011/main" val="1"/>
+                <ma14:wrappingTextBoxFlag xmlns:ma14="http://schemas.microsoft.com/office/mac/drawingml/2011/main" xmlns="" val="1"/>
               </a:ext>
             </a:extLst>
           </p:spPr>
@@ -9110,7 +9120,7 @@
           </a:ln>
           <a:extLst>
             <a:ext uri="{C572A759-6A51-4108-AA02-DFA0A04FC94B}">
-              <ma14:wrappingTextBoxFlag xmlns="" xmlns:ma14="http://schemas.microsoft.com/office/mac/drawingml/2011/main" val="1"/>
+              <ma14:wrappingTextBoxFlag xmlns:ma14="http://schemas.microsoft.com/office/mac/drawingml/2011/main" xmlns="" val="1"/>
             </a:ext>
           </a:extLst>
         </p:spPr>
@@ -9204,7 +9214,7 @@
           </a:ln>
           <a:extLst>
             <a:ext uri="{C572A759-6A51-4108-AA02-DFA0A04FC94B}">
-              <ma14:wrappingTextBoxFlag xmlns="" xmlns:ma14="http://schemas.microsoft.com/office/mac/drawingml/2011/main" val="1"/>
+              <ma14:wrappingTextBoxFlag xmlns:ma14="http://schemas.microsoft.com/office/mac/drawingml/2011/main" xmlns="" val="1"/>
             </a:ext>
           </a:extLst>
         </p:spPr>
@@ -9723,7 +9733,7 @@
             </a:ln>
             <a:extLst>
               <a:ext uri="{C572A759-6A51-4108-AA02-DFA0A04FC94B}">
-                <ma14:wrappingTextBoxFlag xmlns="" xmlns:ma14="http://schemas.microsoft.com/office/mac/drawingml/2011/main" val="1"/>
+                <ma14:wrappingTextBoxFlag xmlns:ma14="http://schemas.microsoft.com/office/mac/drawingml/2011/main" xmlns="" val="1"/>
               </a:ext>
             </a:extLst>
           </p:spPr>
@@ -9775,7 +9785,7 @@
             </a:ln>
             <a:extLst>
               <a:ext uri="{C572A759-6A51-4108-AA02-DFA0A04FC94B}">
-                <ma14:wrappingTextBoxFlag xmlns="" xmlns:ma14="http://schemas.microsoft.com/office/mac/drawingml/2011/main" val="1"/>
+                <ma14:wrappingTextBoxFlag xmlns:ma14="http://schemas.microsoft.com/office/mac/drawingml/2011/main" xmlns="" val="1"/>
               </a:ext>
             </a:extLst>
           </p:spPr>
@@ -10643,7 +10653,7 @@
           </a:ln>
           <a:extLst>
             <a:ext uri="{C572A759-6A51-4108-AA02-DFA0A04FC94B}">
-              <ma14:wrappingTextBoxFlag xmlns="" xmlns:ma14="http://schemas.microsoft.com/office/mac/drawingml/2011/main" val="1"/>
+              <ma14:wrappingTextBoxFlag xmlns:ma14="http://schemas.microsoft.com/office/mac/drawingml/2011/main" xmlns="" val="1"/>
             </a:ext>
           </a:extLst>
         </p:spPr>
@@ -10786,7 +10796,7 @@
                 <a:ea typeface="Calibri"/>
                 <a:cs typeface="Calibri"/>
               </a:rPr>
-              <a:t>version: 19 June 2021:</a:t>
+              <a:t>version: 25 June 2021:</a:t>
             </a:r>
             <a:br>
               <a:rPr lang="en-US" sz="2800" dirty="0">
@@ -11132,7 +11142,7 @@
           </a:ln>
           <a:extLst>
             <a:ext uri="{C572A759-6A51-4108-AA02-DFA0A04FC94B}">
-              <ma14:wrappingTextBoxFlag xmlns="" xmlns:ma14="http://schemas.microsoft.com/office/mac/drawingml/2011/main" val="1"/>
+              <ma14:wrappingTextBoxFlag xmlns:ma14="http://schemas.microsoft.com/office/mac/drawingml/2011/main" xmlns="" val="1"/>
             </a:ext>
           </a:extLst>
         </p:spPr>
@@ -11748,7 +11758,7 @@
           </a:ln>
           <a:extLst>
             <a:ext uri="{C572A759-6A51-4108-AA02-DFA0A04FC94B}">
-              <ma14:wrappingTextBoxFlag xmlns="" xmlns:ma14="http://schemas.microsoft.com/office/mac/drawingml/2011/main" val="1"/>
+              <ma14:wrappingTextBoxFlag xmlns:ma14="http://schemas.microsoft.com/office/mac/drawingml/2011/main" xmlns="" val="1"/>
             </a:ext>
           </a:extLst>
         </p:spPr>
@@ -12028,20 +12038,22 @@
               <a:gd name="adj" fmla="val 16667"/>
             </a:avLst>
           </a:prstGeom>
-          <a:ln/>
+          <a:ln>
+            <a:noFill/>
+          </a:ln>
         </p:spPr>
         <p:style>
           <a:lnRef idx="1">
-            <a:schemeClr val="accent1"/>
+            <a:schemeClr val="dk1"/>
           </a:lnRef>
-          <a:fillRef idx="3">
-            <a:schemeClr val="accent1"/>
+          <a:fillRef idx="2">
+            <a:schemeClr val="dk1"/>
           </a:fillRef>
-          <a:effectRef idx="2">
-            <a:schemeClr val="accent1"/>
+          <a:effectRef idx="1">
+            <a:schemeClr val="dk1"/>
           </a:effectRef>
           <a:fontRef idx="minor">
-            <a:schemeClr val="lt1"/>
+            <a:schemeClr val="dk1"/>
           </a:fontRef>
         </p:style>
         <p:txBody>
@@ -12054,80 +12066,132 @@
             <a:r>
               <a:rPr lang="en-US" sz="2900" dirty="0">
                 <a:solidFill>
-                  <a:schemeClr val="lt1"/>
-                </a:solidFill>
-                <a:latin typeface="+mn-lt"/>
-                <a:ea typeface="+mn-ea"/>
-                <a:cs typeface="+mn-cs"/>
-              </a:rPr>
-              <a:t>1: [</a:t>
+                  <a:schemeClr val="dk1">
+                    <a:alpha val="25000"/>
+                  </a:schemeClr>
+                </a:solidFill>
+                <a:latin typeface="Calibri" charset="0"/>
+                <a:cs typeface="Calibri" charset="0"/>
+              </a:rPr>
+              <a:t>[</a:t>
             </a:r>
             <a:r>
               <a:rPr lang="en-US" sz="2900" dirty="0" err="1">
                 <a:solidFill>
-                  <a:schemeClr val="lt1"/>
-                </a:solidFill>
-                <a:latin typeface="+mn-lt"/>
-                <a:ea typeface="+mn-ea"/>
-                <a:cs typeface="+mn-cs"/>
+                  <a:schemeClr val="dk1">
+                    <a:alpha val="25000"/>
+                  </a:schemeClr>
+                </a:solidFill>
+                <a:latin typeface="Calibri" charset="0"/>
+                <a:cs typeface="Calibri" charset="0"/>
               </a:rPr>
               <a:t>MoL</a:t>
             </a:r>
             <a:r>
               <a:rPr lang="en-US" sz="2900" dirty="0">
                 <a:solidFill>
-                  <a:schemeClr val="lt1"/>
-                </a:solidFill>
-                <a:latin typeface="+mn-lt"/>
-                <a:ea typeface="+mn-ea"/>
-                <a:cs typeface="+mn-cs"/>
+                  <a:schemeClr val="dk1">
+                    <a:alpha val="25000"/>
+                  </a:schemeClr>
+                </a:solidFill>
+                <a:latin typeface="Calibri" charset="0"/>
+                <a:cs typeface="Calibri" charset="0"/>
               </a:rPr>
               <a:t>-FNWI] </a:t>
             </a:r>
             <a:br>
               <a:rPr lang="en-US" sz="2900" dirty="0">
                 <a:solidFill>
-                  <a:schemeClr val="lt1"/>
-                </a:solidFill>
-                <a:latin typeface="+mn-lt"/>
-                <a:ea typeface="+mn-ea"/>
-                <a:cs typeface="+mn-cs"/>
+                  <a:schemeClr val="dk1">
+                    <a:alpha val="25000"/>
+                  </a:schemeClr>
+                </a:solidFill>
+                <a:latin typeface="Calibri" charset="0"/>
+                <a:cs typeface="Calibri" charset="0"/>
               </a:rPr>
             </a:br>
             <a:r>
-              <a:rPr lang="en-US" sz="2900" dirty="0"/>
+              <a:rPr lang="en-US" sz="2900" dirty="0">
+                <a:solidFill>
+                  <a:schemeClr val="dk1">
+                    <a:alpha val="25000"/>
+                  </a:schemeClr>
+                </a:solidFill>
+                <a:latin typeface="Calibri" charset="0"/>
+                <a:cs typeface="Calibri" charset="0"/>
+              </a:rPr>
               <a:t>Capita Selecta: </a:t>
             </a:r>
             <a:br>
-              <a:rPr lang="en-US" sz="2900" dirty="0"/>
+              <a:rPr lang="en-US" sz="2900" dirty="0">
+                <a:solidFill>
+                  <a:schemeClr val="dk1">
+                    <a:alpha val="25000"/>
+                  </a:schemeClr>
+                </a:solidFill>
+                <a:latin typeface="Calibri" charset="0"/>
+                <a:cs typeface="Calibri" charset="0"/>
+              </a:rPr>
             </a:br>
             <a:r>
-              <a:rPr lang="en-US" sz="2900" dirty="0"/>
+              <a:rPr lang="en-US" sz="2900" dirty="0">
+                <a:solidFill>
+                  <a:schemeClr val="dk1">
+                    <a:alpha val="25000"/>
+                  </a:schemeClr>
+                </a:solidFill>
+                <a:latin typeface="Calibri" charset="0"/>
+                <a:cs typeface="Calibri" charset="0"/>
+              </a:rPr>
               <a:t>Set Theory </a:t>
             </a:r>
             <a:br>
-              <a:rPr lang="en-US" sz="2900" dirty="0"/>
+              <a:rPr lang="en-US" sz="2900" dirty="0">
+                <a:solidFill>
+                  <a:schemeClr val="dk1">
+                    <a:alpha val="25000"/>
+                  </a:schemeClr>
+                </a:solidFill>
+                <a:latin typeface="Calibri" charset="0"/>
+                <a:cs typeface="Calibri" charset="0"/>
+              </a:rPr>
             </a:br>
             <a:r>
-              <a:rPr lang="en-US" sz="2900" dirty="0"/>
+              <a:rPr lang="en-US" sz="2900" dirty="0">
+                <a:solidFill>
+                  <a:schemeClr val="dk1">
+                    <a:alpha val="25000"/>
+                  </a:schemeClr>
+                </a:solidFill>
+                <a:latin typeface="Calibri" charset="0"/>
+                <a:cs typeface="Calibri" charset="0"/>
+              </a:rPr>
               <a:t>(</a:t>
             </a:r>
             <a:r>
-              <a:rPr lang="en-US" sz="2900" dirty="0" err="1"/>
+              <a:rPr lang="en-US" sz="2900" dirty="0" err="1">
+                <a:solidFill>
+                  <a:schemeClr val="dk1">
+                    <a:alpha val="25000"/>
+                  </a:schemeClr>
+                </a:solidFill>
+                <a:latin typeface="Calibri" charset="0"/>
+                <a:cs typeface="Calibri" charset="0"/>
+              </a:rPr>
               <a:t>Löwe</a:t>
             </a:r>
             <a:r>
-              <a:rPr lang="en-US" sz="2900" dirty="0"/>
+              <a:rPr lang="en-US" sz="2900" dirty="0">
+                <a:solidFill>
+                  <a:schemeClr val="dk1">
+                    <a:alpha val="25000"/>
+                  </a:schemeClr>
+                </a:solidFill>
+                <a:latin typeface="Calibri" charset="0"/>
+                <a:cs typeface="Calibri" charset="0"/>
+              </a:rPr>
               <a:t>)</a:t>
             </a:r>
-            <a:endParaRPr lang="en-US" sz="2900" dirty="0">
-              <a:solidFill>
-                <a:schemeClr val="lt1"/>
-              </a:solidFill>
-              <a:latin typeface="+mn-lt"/>
-              <a:ea typeface="+mn-ea"/>
-              <a:cs typeface="+mn-cs"/>
-            </a:endParaRPr>
           </a:p>
         </p:txBody>
       </p:sp>

</xml_diff>